<commit_message>
updated with out of scope info
</commit_message>
<xml_diff>
--- a/TEgan_CSCI-E-33A_FinalProject.pptx
+++ b/TEgan_CSCI-E-33A_FinalProject.pptx
@@ -17,7 +17,7 @@
     <p:sldId id="274" r:id="rId11"/>
     <p:sldId id="275" r:id="rId12"/>
     <p:sldId id="276" r:id="rId13"/>
-    <p:sldId id="277" r:id="rId14"/>
+    <p:sldId id="278" r:id="rId14"/>
   </p:sldIdLst>
   <p:sldSz cx="12192000" cy="6858000"/>
   <p:notesSz cx="6858000" cy="9144000"/>
@@ -133,14 +133,16 @@
             <p14:sldId id="274"/>
             <p14:sldId id="275"/>
             <p14:sldId id="276"/>
+            <p14:sldId id="278"/>
           </p14:sldIdLst>
         </p14:section>
         <p14:section name="Untitled Section" id="{8AD5A90C-9B04-4953-BE1C-4505D50CD746}">
-          <p14:sldIdLst>
-            <p14:sldId id="277"/>
-          </p14:sldIdLst>
+          <p14:sldIdLst/>
         </p14:section>
       </p14:sectionLst>
+    </p:ext>
+    <p:ext uri="{EFAFB233-063F-42B5-8137-9DF3F51BA10A}">
+      <p15:sldGuideLst xmlns:p15="http://schemas.microsoft.com/office/powerpoint/2012/main"/>
     </p:ext>
   </p:extLst>
 </p:presentation>
@@ -293,7 +295,7 @@
           <a:p>
             <a:fld id="{8B09F1E3-A698-423E-8910-23CB948455DD}" type="datetimeFigureOut">
               <a:rPr lang="en-US" smtClean="0"/>
-              <a:t>11/18/2020</a:t>
+              <a:t>11/19/2020</a:t>
             </a:fld>
             <a:endParaRPr lang="en-US"/>
           </a:p>
@@ -491,7 +493,7 @@
           <a:p>
             <a:fld id="{8B09F1E3-A698-423E-8910-23CB948455DD}" type="datetimeFigureOut">
               <a:rPr lang="en-US" smtClean="0"/>
-              <a:t>11/18/2020</a:t>
+              <a:t>11/19/2020</a:t>
             </a:fld>
             <a:endParaRPr lang="en-US"/>
           </a:p>
@@ -699,7 +701,7 @@
           <a:p>
             <a:fld id="{8B09F1E3-A698-423E-8910-23CB948455DD}" type="datetimeFigureOut">
               <a:rPr lang="en-US" smtClean="0"/>
-              <a:t>11/18/2020</a:t>
+              <a:t>11/19/2020</a:t>
             </a:fld>
             <a:endParaRPr lang="en-US"/>
           </a:p>
@@ -897,7 +899,7 @@
           <a:p>
             <a:fld id="{8B09F1E3-A698-423E-8910-23CB948455DD}" type="datetimeFigureOut">
               <a:rPr lang="en-US" smtClean="0"/>
-              <a:t>11/18/2020</a:t>
+              <a:t>11/19/2020</a:t>
             </a:fld>
             <a:endParaRPr lang="en-US"/>
           </a:p>
@@ -1172,7 +1174,7 @@
           <a:p>
             <a:fld id="{8B09F1E3-A698-423E-8910-23CB948455DD}" type="datetimeFigureOut">
               <a:rPr lang="en-US" smtClean="0"/>
-              <a:t>11/18/2020</a:t>
+              <a:t>11/19/2020</a:t>
             </a:fld>
             <a:endParaRPr lang="en-US"/>
           </a:p>
@@ -1437,7 +1439,7 @@
           <a:p>
             <a:fld id="{8B09F1E3-A698-423E-8910-23CB948455DD}" type="datetimeFigureOut">
               <a:rPr lang="en-US" smtClean="0"/>
-              <a:t>11/18/2020</a:t>
+              <a:t>11/19/2020</a:t>
             </a:fld>
             <a:endParaRPr lang="en-US"/>
           </a:p>
@@ -1849,7 +1851,7 @@
           <a:p>
             <a:fld id="{8B09F1E3-A698-423E-8910-23CB948455DD}" type="datetimeFigureOut">
               <a:rPr lang="en-US" smtClean="0"/>
-              <a:t>11/18/2020</a:t>
+              <a:t>11/19/2020</a:t>
             </a:fld>
             <a:endParaRPr lang="en-US"/>
           </a:p>
@@ -1990,7 +1992,7 @@
           <a:p>
             <a:fld id="{8B09F1E3-A698-423E-8910-23CB948455DD}" type="datetimeFigureOut">
               <a:rPr lang="en-US" smtClean="0"/>
-              <a:t>11/18/2020</a:t>
+              <a:t>11/19/2020</a:t>
             </a:fld>
             <a:endParaRPr lang="en-US"/>
           </a:p>
@@ -2103,7 +2105,7 @@
           <a:p>
             <a:fld id="{8B09F1E3-A698-423E-8910-23CB948455DD}" type="datetimeFigureOut">
               <a:rPr lang="en-US" smtClean="0"/>
-              <a:t>11/18/2020</a:t>
+              <a:t>11/19/2020</a:t>
             </a:fld>
             <a:endParaRPr lang="en-US"/>
           </a:p>
@@ -2414,7 +2416,7 @@
           <a:p>
             <a:fld id="{8B09F1E3-A698-423E-8910-23CB948455DD}" type="datetimeFigureOut">
               <a:rPr lang="en-US" smtClean="0"/>
-              <a:t>11/18/2020</a:t>
+              <a:t>11/19/2020</a:t>
             </a:fld>
             <a:endParaRPr lang="en-US"/>
           </a:p>
@@ -2702,7 +2704,7 @@
           <a:p>
             <a:fld id="{8B09F1E3-A698-423E-8910-23CB948455DD}" type="datetimeFigureOut">
               <a:rPr lang="en-US" smtClean="0"/>
-              <a:t>11/18/2020</a:t>
+              <a:t>11/19/2020</a:t>
             </a:fld>
             <a:endParaRPr lang="en-US"/>
           </a:p>
@@ -2943,7 +2945,7 @@
           <a:p>
             <a:fld id="{8B09F1E3-A698-423E-8910-23CB948455DD}" type="datetimeFigureOut">
               <a:rPr lang="en-US" smtClean="0"/>
-              <a:t>11/18/2020</a:t>
+              <a:t>11/19/2020</a:t>
             </a:fld>
             <a:endParaRPr lang="en-US"/>
           </a:p>
@@ -3863,7 +3865,7 @@
             </a:pPr>
             <a:r>
               <a:rPr lang="en-US" dirty="0"/>
-              <a:t>Members can opt to add a calendar visualization to track daily word count</a:t>
+              <a:t>Members can opt to add a calendar visualization to track daily word count (leap year excluded from this assignment)</a:t>
             </a:r>
           </a:p>
           <a:p>
@@ -3976,7 +3978,7 @@
           <a:p>
             <a:r>
               <a:rPr lang="en-US" sz="3600" dirty="0"/>
-              <a:t>WeCountWords for Writing Productivity</a:t>
+              <a:t>Excluded from the final project</a:t>
             </a:r>
           </a:p>
         </p:txBody>
@@ -3997,12 +3999,7 @@
             <p:ph idx="1"/>
           </p:nvPr>
         </p:nvSpPr>
-        <p:spPr>
-          <a:xfrm>
-            <a:off x="838200" y="1825624"/>
-            <a:ext cx="5861538" cy="5032375"/>
-          </a:xfrm>
-        </p:spPr>
+        <p:spPr/>
         <p:txBody>
           <a:bodyPr>
             <a:normAutofit/>
@@ -4016,7 +4013,7 @@
             </a:pPr>
             <a:r>
               <a:rPr lang="en-US" dirty="0"/>
-              <a:t>Concept</a:t>
+              <a:t>Features that are considered outside the scope of the final project</a:t>
             </a:r>
           </a:p>
           <a:p>
@@ -4027,7 +4024,7 @@
             </a:pPr>
             <a:r>
               <a:rPr lang="en-US" dirty="0"/>
-              <a:t>Users (aka members) add their word count daily, or on the days that they write</a:t>
+              <a:t>Leap year calculations needed to support the daily count in the calendar view in the “BEST” requirements</a:t>
             </a:r>
           </a:p>
           <a:p>
@@ -4038,134 +4035,32 @@
             </a:pPr>
             <a:r>
               <a:rPr lang="en-US" dirty="0"/>
-              <a:t>The word count history is translated into three different visualizations to help the author build their productivity: Daily Count, Words Counted by Day of Week, Total Words Counted</a:t>
-            </a:r>
-          </a:p>
-          <a:p>
-            <a:pPr lvl="1">
+              <a:t>Dynamic nightly updates of the all-member cumulative word count visualizations on index.html before login.</a:t>
+            </a:r>
+          </a:p>
+          <a:p>
+            <a:pPr marL="0" indent="0">
+              <a:spcAft>
+                <a:spcPts val="900"/>
+              </a:spcAft>
+              <a:buNone/>
+            </a:pPr>
+            <a:endParaRPr lang="en-US" dirty="0"/>
+          </a:p>
+          <a:p>
+            <a:pPr>
               <a:spcAft>
                 <a:spcPts val="900"/>
               </a:spcAft>
             </a:pPr>
-            <a:r>
-              <a:rPr lang="en-US" dirty="0"/>
-              <a:t>Members and non-members alike also have access to a selection of content</a:t>
-            </a:r>
-          </a:p>
-        </p:txBody>
-      </p:sp>
-      <p:pic>
-        <p:nvPicPr>
-          <p:cNvPr id="11" name="Picture 10" descr="Chart, bar chart&#10;&#10;Description automatically generated">
-            <a:extLst>
-              <a:ext uri="{FF2B5EF4-FFF2-40B4-BE49-F238E27FC236}">
-                <a16:creationId xmlns:a16="http://schemas.microsoft.com/office/drawing/2014/main" id="{17F5B27F-F828-4CEC-BE9A-1D7A9ED26657}"/>
-              </a:ext>
-            </a:extLst>
-          </p:cNvPr>
-          <p:cNvPicPr>
-            <a:picLocks noChangeAspect="1"/>
-          </p:cNvPicPr>
-          <p:nvPr/>
-        </p:nvPicPr>
-        <p:blipFill>
-          <a:blip r:embed="rId2">
-            <a:extLst>
-              <a:ext uri="{28A0092B-C50C-407E-A947-70E740481C1C}">
-                <a14:useLocalDpi xmlns:a14="http://schemas.microsoft.com/office/drawing/2010/main" val="0"/>
-              </a:ext>
-            </a:extLst>
-          </a:blip>
-          <a:stretch>
-            <a:fillRect/>
-          </a:stretch>
-        </p:blipFill>
-        <p:spPr>
-          <a:xfrm>
-            <a:off x="6506309" y="1465151"/>
-            <a:ext cx="4457607" cy="2005113"/>
-          </a:xfrm>
-          <a:prstGeom prst="rect">
-            <a:avLst/>
-          </a:prstGeom>
-        </p:spPr>
-      </p:pic>
-      <p:pic>
-        <p:nvPicPr>
-          <p:cNvPr id="13" name="Picture 12" descr="Table&#10;&#10;Description automatically generated">
-            <a:extLst>
-              <a:ext uri="{FF2B5EF4-FFF2-40B4-BE49-F238E27FC236}">
-                <a16:creationId xmlns:a16="http://schemas.microsoft.com/office/drawing/2014/main" id="{5A96A874-996E-452B-9978-A9C3F4E0E369}"/>
-              </a:ext>
-            </a:extLst>
-          </p:cNvPr>
-          <p:cNvPicPr>
-            <a:picLocks noChangeAspect="1"/>
-          </p:cNvPicPr>
-          <p:nvPr/>
-        </p:nvPicPr>
-        <p:blipFill>
-          <a:blip r:embed="rId3">
-            <a:extLst>
-              <a:ext uri="{28A0092B-C50C-407E-A947-70E740481C1C}">
-                <a14:useLocalDpi xmlns:a14="http://schemas.microsoft.com/office/drawing/2010/main" val="0"/>
-              </a:ext>
-            </a:extLst>
-          </a:blip>
-          <a:stretch>
-            <a:fillRect/>
-          </a:stretch>
-        </p:blipFill>
-        <p:spPr>
-          <a:xfrm>
-            <a:off x="6883385" y="2561960"/>
-            <a:ext cx="4699352" cy="2174508"/>
-          </a:xfrm>
-          <a:prstGeom prst="rect">
-            <a:avLst/>
-          </a:prstGeom>
-        </p:spPr>
-      </p:pic>
-      <p:pic>
-        <p:nvPicPr>
-          <p:cNvPr id="15" name="Picture 14" descr="A picture containing table&#10;&#10;Description automatically generated">
-            <a:extLst>
-              <a:ext uri="{FF2B5EF4-FFF2-40B4-BE49-F238E27FC236}">
-                <a16:creationId xmlns:a16="http://schemas.microsoft.com/office/drawing/2014/main" id="{E57025EB-5170-4DB2-8AFB-DF35949E3CAD}"/>
-              </a:ext>
-            </a:extLst>
-          </p:cNvPr>
-          <p:cNvPicPr>
-            <a:picLocks noChangeAspect="1"/>
-          </p:cNvPicPr>
-          <p:nvPr/>
-        </p:nvPicPr>
-        <p:blipFill>
-          <a:blip r:embed="rId4">
-            <a:extLst>
-              <a:ext uri="{28A0092B-C50C-407E-A947-70E740481C1C}">
-                <a14:useLocalDpi xmlns:a14="http://schemas.microsoft.com/office/drawing/2010/main" val="0"/>
-              </a:ext>
-            </a:extLst>
-          </a:blip>
-          <a:stretch>
-            <a:fillRect/>
-          </a:stretch>
-        </p:blipFill>
-        <p:spPr>
-          <a:xfrm>
-            <a:off x="7422621" y="4053880"/>
-            <a:ext cx="4547837" cy="2078522"/>
-          </a:xfrm>
-          <a:prstGeom prst="rect">
-            <a:avLst/>
-          </a:prstGeom>
-        </p:spPr>
-      </p:pic>
+            <a:endParaRPr lang="en-US" dirty="0"/>
+          </a:p>
+        </p:txBody>
+      </p:sp>
     </p:spTree>
     <p:extLst>
       <p:ext uri="{BB962C8B-B14F-4D97-AF65-F5344CB8AC3E}">
-        <p14:creationId xmlns:p14="http://schemas.microsoft.com/office/powerpoint/2010/main" val="3590536215"/>
+        <p14:creationId xmlns:p14="http://schemas.microsoft.com/office/powerpoint/2010/main" val="4168147291"/>
       </p:ext>
     </p:extLst>
   </p:cSld>
@@ -4620,7 +4515,7 @@
         <p:spPr>
           <a:xfrm>
             <a:off x="838201" y="1825625"/>
-            <a:ext cx="6051804" cy="4764936"/>
+            <a:ext cx="6353822" cy="4764936"/>
           </a:xfrm>
         </p:spPr>
         <p:txBody>
@@ -4658,7 +4553,7 @@
             </a:pPr>
             <a:r>
               <a:rPr lang="en-US" dirty="0"/>
-              <a:t>Data visualizations on this page spotlight the cumulative progress of all WCW members</a:t>
+              <a:t>Data visualizations on this page spotlight  cumulative progress of all WCW members updated once per day (outside of the scope of this project)</a:t>
             </a:r>
           </a:p>
           <a:p>
@@ -4704,7 +4599,7 @@
             </a:r>
             <a:r>
               <a:rPr lang="en-US" dirty="0"/>
-              <a:t> is an anchor to the page area that answers this question, for those who need to do more research before sign-up</a:t>
+              <a:t> is an anchor to the page area that answers this question, for those who need more info</a:t>
             </a:r>
           </a:p>
           <a:p>

</xml_diff>